<commit_message>
Gotowa praca bez poprawionego streszczenia streszczenia
</commit_message>
<xml_diff>
--- a/Plakat/Plakat.pptx
+++ b/Plakat/Plakat.pptx
@@ -243,7 +243,7 @@
           <a:p>
             <a:fld id="{DB1C0BAA-08A6-4370-BC9C-3817CAFEF60B}" type="datetimeFigureOut">
               <a:rPr lang="en-US" smtClean="0"/>
-              <a:t>10/29/2018</a:t>
+              <a:t>11/30/2018</a:t>
             </a:fld>
             <a:endParaRPr lang="en-US"/>
           </a:p>
@@ -413,7 +413,7 @@
           <a:p>
             <a:fld id="{DB1C0BAA-08A6-4370-BC9C-3817CAFEF60B}" type="datetimeFigureOut">
               <a:rPr lang="en-US" smtClean="0"/>
-              <a:t>10/29/2018</a:t>
+              <a:t>11/30/2018</a:t>
             </a:fld>
             <a:endParaRPr lang="en-US"/>
           </a:p>
@@ -593,7 +593,7 @@
           <a:p>
             <a:fld id="{DB1C0BAA-08A6-4370-BC9C-3817CAFEF60B}" type="datetimeFigureOut">
               <a:rPr lang="en-US" smtClean="0"/>
-              <a:t>10/29/2018</a:t>
+              <a:t>11/30/2018</a:t>
             </a:fld>
             <a:endParaRPr lang="en-US"/>
           </a:p>
@@ -763,7 +763,7 @@
           <a:p>
             <a:fld id="{DB1C0BAA-08A6-4370-BC9C-3817CAFEF60B}" type="datetimeFigureOut">
               <a:rPr lang="en-US" smtClean="0"/>
-              <a:t>10/29/2018</a:t>
+              <a:t>11/30/2018</a:t>
             </a:fld>
             <a:endParaRPr lang="en-US"/>
           </a:p>
@@ -1007,7 +1007,7 @@
           <a:p>
             <a:fld id="{DB1C0BAA-08A6-4370-BC9C-3817CAFEF60B}" type="datetimeFigureOut">
               <a:rPr lang="en-US" smtClean="0"/>
-              <a:t>10/29/2018</a:t>
+              <a:t>11/30/2018</a:t>
             </a:fld>
             <a:endParaRPr lang="en-US"/>
           </a:p>
@@ -1239,7 +1239,7 @@
           <a:p>
             <a:fld id="{DB1C0BAA-08A6-4370-BC9C-3817CAFEF60B}" type="datetimeFigureOut">
               <a:rPr lang="en-US" smtClean="0"/>
-              <a:t>10/29/2018</a:t>
+              <a:t>11/30/2018</a:t>
             </a:fld>
             <a:endParaRPr lang="en-US"/>
           </a:p>
@@ -1606,7 +1606,7 @@
           <a:p>
             <a:fld id="{DB1C0BAA-08A6-4370-BC9C-3817CAFEF60B}" type="datetimeFigureOut">
               <a:rPr lang="en-US" smtClean="0"/>
-              <a:t>10/29/2018</a:t>
+              <a:t>11/30/2018</a:t>
             </a:fld>
             <a:endParaRPr lang="en-US"/>
           </a:p>
@@ -1724,7 +1724,7 @@
           <a:p>
             <a:fld id="{DB1C0BAA-08A6-4370-BC9C-3817CAFEF60B}" type="datetimeFigureOut">
               <a:rPr lang="en-US" smtClean="0"/>
-              <a:t>10/29/2018</a:t>
+              <a:t>11/30/2018</a:t>
             </a:fld>
             <a:endParaRPr lang="en-US"/>
           </a:p>
@@ -1819,7 +1819,7 @@
           <a:p>
             <a:fld id="{DB1C0BAA-08A6-4370-BC9C-3817CAFEF60B}" type="datetimeFigureOut">
               <a:rPr lang="en-US" smtClean="0"/>
-              <a:t>10/29/2018</a:t>
+              <a:t>11/30/2018</a:t>
             </a:fld>
             <a:endParaRPr lang="en-US"/>
           </a:p>
@@ -2096,7 +2096,7 @@
           <a:p>
             <a:fld id="{DB1C0BAA-08A6-4370-BC9C-3817CAFEF60B}" type="datetimeFigureOut">
               <a:rPr lang="en-US" smtClean="0"/>
-              <a:t>10/29/2018</a:t>
+              <a:t>11/30/2018</a:t>
             </a:fld>
             <a:endParaRPr lang="en-US"/>
           </a:p>
@@ -2353,7 +2353,7 @@
           <a:p>
             <a:fld id="{DB1C0BAA-08A6-4370-BC9C-3817CAFEF60B}" type="datetimeFigureOut">
               <a:rPr lang="en-US" smtClean="0"/>
-              <a:t>10/29/2018</a:t>
+              <a:t>11/30/2018</a:t>
             </a:fld>
             <a:endParaRPr lang="en-US"/>
           </a:p>
@@ -2566,7 +2566,7 @@
           <a:p>
             <a:fld id="{DB1C0BAA-08A6-4370-BC9C-3817CAFEF60B}" type="datetimeFigureOut">
               <a:rPr lang="en-US" smtClean="0"/>
-              <a:t>10/29/2018</a:t>
+              <a:t>11/30/2018</a:t>
             </a:fld>
             <a:endParaRPr lang="en-US"/>
           </a:p>
@@ -2971,8 +2971,8 @@
           <a:chExt cx="0" cy="0"/>
         </a:xfrm>
       </p:grpSpPr>
-      <mc:AlternateContent xmlns:mc="http://schemas.openxmlformats.org/markup-compatibility/2006">
-        <mc:Choice xmlns:a14="http://schemas.microsoft.com/office/drawing/2010/main" Requires="a14">
+      <mc:AlternateContent xmlns:mc="http://schemas.openxmlformats.org/markup-compatibility/2006" xmlns:a14="http://schemas.microsoft.com/office/drawing/2010/main">
+        <mc:Choice Requires="a14">
           <p:sp>
             <p:nvSpPr>
               <p:cNvPr id="2" name="TextBox 1">
@@ -3011,7 +3011,7 @@
                     <m:sSub>
                       <m:sSubPr>
                         <m:ctrlPr>
-                          <a:rPr lang="pl-PL" sz="2800" b="1" smtClean="0">
+                          <a:rPr lang="pl-PL" sz="2800" b="1" i="1" smtClean="0">
                             <a:latin typeface="Cambria Math" panose="02040503050406030204" pitchFamily="18" charset="0"/>
                           </a:rPr>
                         </m:ctrlPr>
@@ -3036,7 +3036,7 @@
                     <m:sSub>
                       <m:sSubPr>
                         <m:ctrlPr>
-                          <a:rPr lang="pl-PL" sz="2800" b="1" smtClean="0">
+                          <a:rPr lang="pl-PL" sz="2800" b="1" i="1" smtClean="0">
                             <a:latin typeface="Cambria Math" panose="02040503050406030204" pitchFamily="18" charset="0"/>
                           </a:rPr>
                         </m:ctrlPr>
@@ -3065,7 +3065,7 @@
             </p:txBody>
           </p:sp>
         </mc:Choice>
-        <mc:Fallback>
+        <mc:Fallback xmlns="">
           <p:sp>
             <p:nvSpPr>
               <p:cNvPr id="2" name="TextBox 1">
@@ -3110,8 +3110,8 @@
           </p:sp>
         </mc:Fallback>
       </mc:AlternateContent>
-      <mc:AlternateContent xmlns:mc="http://schemas.openxmlformats.org/markup-compatibility/2006">
-        <mc:Choice xmlns:a14="http://schemas.microsoft.com/office/drawing/2010/main" Requires="a14">
+      <mc:AlternateContent xmlns:mc="http://schemas.openxmlformats.org/markup-compatibility/2006" xmlns:a14="http://schemas.microsoft.com/office/drawing/2010/main">
+        <mc:Choice Requires="a14">
           <p:sp>
             <p:nvSpPr>
               <p:cNvPr id="5" name="TextBox 4">
@@ -3146,14 +3146,22 @@
                 </a:r>
                 <a:r>
                   <a:rPr lang="pl-PL" sz="1400" dirty="0"/>
-                  <a:t>Praca dotyczy badania widm polaryzacyjnych materiału </a:t>
+                  <a:t>Praca dotyczy badania widm polaryzacyjnych</a:t>
+                </a:r>
+                <a:r>
+                  <a:rPr lang="ru-RU" sz="1400" dirty="0"/>
+                  <a:t> </a:t>
+                </a:r>
+                <a:r>
+                  <a:rPr lang="pl-PL" sz="1400" dirty="0"/>
+                  <a:t>warstw </a:t>
                 </a:r>
                 <a14:m>
                   <m:oMath xmlns:m="http://schemas.openxmlformats.org/officeDocument/2006/math">
                     <m:sSub>
                       <m:sSubPr>
                         <m:ctrlPr>
-                          <a:rPr lang="pl-PL" sz="1400" b="1">
+                          <a:rPr lang="pl-PL" sz="1400" b="1" i="1">
                             <a:latin typeface="Cambria Math" panose="02040503050406030204" pitchFamily="18" charset="0"/>
                           </a:rPr>
                         </m:ctrlPr>
@@ -3169,109 +3177,6 @@
                       <m:sub>
                         <m:r>
                           <a:rPr lang="pl-PL" sz="1400" b="1" i="0">
-                            <a:latin typeface="Cambria Math" panose="02040503050406030204" pitchFamily="18" charset="0"/>
-                          </a:rPr>
-                          <m:t>𝟐</m:t>
-                        </m:r>
-                      </m:sub>
-                    </m:sSub>
-                    <m:sSub>
-                      <m:sSubPr>
-                        <m:ctrlPr>
-                          <a:rPr lang="pl-PL" sz="1400" b="1">
-                            <a:latin typeface="Cambria Math" panose="02040503050406030204" pitchFamily="18" charset="0"/>
-                          </a:rPr>
-                        </m:ctrlPr>
-                      </m:sSubPr>
-                      <m:e>
-                        <m:r>
-                          <a:rPr lang="pl-PL" sz="1400" b="1" i="0">
-                            <a:latin typeface="Cambria Math" panose="02040503050406030204" pitchFamily="18" charset="0"/>
-                          </a:rPr>
-                          <m:t>𝐒</m:t>
-                        </m:r>
-                      </m:e>
-                      <m:sub>
-                        <m:r>
-                          <a:rPr lang="pl-PL" sz="1400" b="1" i="0">
-                            <a:latin typeface="Cambria Math" panose="02040503050406030204" pitchFamily="18" charset="0"/>
-                          </a:rPr>
-                          <m:t>𝟑</m:t>
-                        </m:r>
-                      </m:sub>
-                    </m:sSub>
-                  </m:oMath>
-                </a14:m>
-                <a:r>
-                  <a:rPr lang="pl-PL" sz="1400" dirty="0"/>
-                  <a:t>, który został wyhodowany </a:t>
-                </a:r>
-                <a:r>
-                  <a:rPr lang="en-US" sz="1400" dirty="0" err="1"/>
-                  <a:t>na</a:t>
-                </a:r>
-                <a:r>
-                  <a:rPr lang="en-US" sz="1400" dirty="0"/>
-                  <a:t> </a:t>
-                </a:r>
-                <a:r>
-                  <a:rPr lang="en-US" sz="1400" dirty="0" err="1"/>
-                  <a:t>fosforku</a:t>
-                </a:r>
-                <a:r>
-                  <a:rPr lang="en-US" sz="1400" dirty="0"/>
-                  <a:t> </a:t>
-                </a:r>
-                <a:r>
-                  <a:rPr lang="en-US" sz="1400" dirty="0" err="1"/>
-                  <a:t>galu</a:t>
-                </a:r>
-                <a:r>
-                  <a:rPr lang="pl-PL" sz="1400" dirty="0"/>
-                  <a:t> </a:t>
-                </a:r>
-                <a:r>
-                  <a:rPr lang="pl-PL" sz="1400" b="1" dirty="0" err="1"/>
-                  <a:t>GaP</a:t>
-                </a:r>
-                <a:r>
-                  <a:rPr lang="pl-PL" sz="1400" b="1" dirty="0"/>
-                  <a:t>.</a:t>
-                </a:r>
-              </a:p>
-              <a:p>
-                <a:endParaRPr lang="pl-PL" sz="1400" b="1" dirty="0"/>
-              </a:p>
-              <a:p>
-                <a:r>
-                  <a:rPr lang="pl-PL" sz="1400" b="1" dirty="0"/>
-                  <a:t>	</a:t>
-                </a:r>
-                <a:r>
-                  <a:rPr lang="pl-PL" sz="1400" dirty="0"/>
-                  <a:t> Związek </a:t>
-                </a:r>
-                <a14:m>
-                  <m:oMath xmlns:m="http://schemas.openxmlformats.org/officeDocument/2006/math">
-                    <m:sSub>
-                      <m:sSubPr>
-                        <m:ctrlPr>
-                          <a:rPr lang="pl-PL" sz="1400" b="1" i="1">
-                            <a:latin typeface="Cambria Math" panose="02040503050406030204" pitchFamily="18" charset="0"/>
-                          </a:rPr>
-                        </m:ctrlPr>
-                      </m:sSubPr>
-                      <m:e>
-                        <m:r>
-                          <a:rPr lang="pl-PL" sz="1400" b="1">
-                            <a:latin typeface="Cambria Math" panose="02040503050406030204" pitchFamily="18" charset="0"/>
-                          </a:rPr>
-                          <m:t>𝐆𝐚</m:t>
-                        </m:r>
-                      </m:e>
-                      <m:sub>
-                        <m:r>
-                          <a:rPr lang="pl-PL" sz="1400" b="1">
                             <a:latin typeface="Cambria Math" panose="02040503050406030204" pitchFamily="18" charset="0"/>
                           </a:rPr>
                           <m:t>𝟐</m:t>
@@ -3288,6 +3193,109 @@
                       </m:sSubPr>
                       <m:e>
                         <m:r>
+                          <a:rPr lang="pl-PL" sz="1400" b="1" i="0">
+                            <a:latin typeface="Cambria Math" panose="02040503050406030204" pitchFamily="18" charset="0"/>
+                          </a:rPr>
+                          <m:t>𝐒</m:t>
+                        </m:r>
+                      </m:e>
+                      <m:sub>
+                        <m:r>
+                          <a:rPr lang="pl-PL" sz="1400" b="1" i="0">
+                            <a:latin typeface="Cambria Math" panose="02040503050406030204" pitchFamily="18" charset="0"/>
+                          </a:rPr>
+                          <m:t>𝟑</m:t>
+                        </m:r>
+                      </m:sub>
+                    </m:sSub>
+                  </m:oMath>
+                </a14:m>
+                <a:r>
+                  <a:rPr lang="pl-PL" sz="1400" dirty="0"/>
+                  <a:t>, który zostały wytworzone </a:t>
+                </a:r>
+                <a:r>
+                  <a:rPr lang="en-US" sz="1400" dirty="0" err="1"/>
+                  <a:t>na</a:t>
+                </a:r>
+                <a:r>
+                  <a:rPr lang="en-US" sz="1400" dirty="0"/>
+                  <a:t> </a:t>
+                </a:r>
+                <a:r>
+                  <a:rPr lang="en-US" sz="1400" dirty="0" err="1"/>
+                  <a:t>fosforku</a:t>
+                </a:r>
+                <a:r>
+                  <a:rPr lang="en-US" sz="1400" dirty="0"/>
+                  <a:t> </a:t>
+                </a:r>
+                <a:r>
+                  <a:rPr lang="en-US" sz="1400" dirty="0" err="1"/>
+                  <a:t>galu</a:t>
+                </a:r>
+                <a:r>
+                  <a:rPr lang="pl-PL" sz="1400" dirty="0"/>
+                  <a:t> </a:t>
+                </a:r>
+                <a:r>
+                  <a:rPr lang="pl-PL" sz="1400" b="1" dirty="0" err="1"/>
+                  <a:t>GaP</a:t>
+                </a:r>
+                <a:r>
+                  <a:rPr lang="pl-PL" sz="1400" b="1" dirty="0"/>
+                  <a:t>.</a:t>
+                </a:r>
+              </a:p>
+              <a:p>
+                <a:endParaRPr lang="pl-PL" sz="1400" b="1" dirty="0"/>
+              </a:p>
+              <a:p>
+                <a:r>
+                  <a:rPr lang="pl-PL" sz="1400" b="1" dirty="0"/>
+                  <a:t>	</a:t>
+                </a:r>
+                <a:r>
+                  <a:rPr lang="pl-PL" sz="1400" dirty="0"/>
+                  <a:t> Związek </a:t>
+                </a:r>
+                <a14:m>
+                  <m:oMath xmlns:m="http://schemas.openxmlformats.org/officeDocument/2006/math">
+                    <m:sSub>
+                      <m:sSubPr>
+                        <m:ctrlPr>
+                          <a:rPr lang="pl-PL" sz="1400" b="1" i="1">
+                            <a:latin typeface="Cambria Math" panose="02040503050406030204" pitchFamily="18" charset="0"/>
+                          </a:rPr>
+                        </m:ctrlPr>
+                      </m:sSubPr>
+                      <m:e>
+                        <m:r>
+                          <a:rPr lang="pl-PL" sz="1400" b="1">
+                            <a:latin typeface="Cambria Math" panose="02040503050406030204" pitchFamily="18" charset="0"/>
+                          </a:rPr>
+                          <m:t>𝐆𝐚</m:t>
+                        </m:r>
+                      </m:e>
+                      <m:sub>
+                        <m:r>
+                          <a:rPr lang="pl-PL" sz="1400" b="1">
+                            <a:latin typeface="Cambria Math" panose="02040503050406030204" pitchFamily="18" charset="0"/>
+                          </a:rPr>
+                          <m:t>𝟐</m:t>
+                        </m:r>
+                      </m:sub>
+                    </m:sSub>
+                    <m:sSub>
+                      <m:sSubPr>
+                        <m:ctrlPr>
+                          <a:rPr lang="pl-PL" sz="1400" b="1" i="1">
+                            <a:latin typeface="Cambria Math" panose="02040503050406030204" pitchFamily="18" charset="0"/>
+                          </a:rPr>
+                        </m:ctrlPr>
+                      </m:sSubPr>
+                      <m:e>
+                        <m:r>
                           <a:rPr lang="pl-PL" sz="1400" b="1">
                             <a:latin typeface="Cambria Math" panose="02040503050406030204" pitchFamily="18" charset="0"/>
                           </a:rPr>
@@ -3322,7 +3330,7 @@
             </p:txBody>
           </p:sp>
         </mc:Choice>
-        <mc:Fallback>
+        <mc:Fallback xmlns="">
           <p:sp>
             <p:nvSpPr>
               <p:cNvPr id="5" name="TextBox 4">
@@ -3622,8 +3630,8 @@
           </a:prstGeom>
         </p:spPr>
       </p:pic>
-      <mc:AlternateContent xmlns:mc="http://schemas.openxmlformats.org/markup-compatibility/2006">
-        <mc:Choice xmlns:a14="http://schemas.microsoft.com/office/drawing/2010/main" Requires="a14">
+      <mc:AlternateContent xmlns:mc="http://schemas.openxmlformats.org/markup-compatibility/2006" xmlns:a14="http://schemas.microsoft.com/office/drawing/2010/main">
+        <mc:Choice Requires="a14">
           <p:sp>
             <p:nvSpPr>
               <p:cNvPr id="24" name="TextBox 23">
@@ -3758,7 +3766,7 @@
             </p:txBody>
           </p:sp>
         </mc:Choice>
-        <mc:Fallback>
+        <mc:Fallback xmlns="">
           <p:sp>
             <p:nvSpPr>
               <p:cNvPr id="24" name="TextBox 23">
@@ -3947,8 +3955,8 @@
           </a:p>
         </p:txBody>
       </p:sp>
-      <mc:AlternateContent xmlns:mc="http://schemas.openxmlformats.org/markup-compatibility/2006">
-        <mc:Choice xmlns:a14="http://schemas.microsoft.com/office/drawing/2010/main" Requires="a14">
+      <mc:AlternateContent xmlns:mc="http://schemas.openxmlformats.org/markup-compatibility/2006" xmlns:a14="http://schemas.microsoft.com/office/drawing/2010/main">
+        <mc:Choice Requires="a14">
           <p:sp>
             <p:nvSpPr>
               <p:cNvPr id="30" name="TextBox 29">
@@ -4055,7 +4063,7 @@
             </p:txBody>
           </p:sp>
         </mc:Choice>
-        <mc:Fallback>
+        <mc:Fallback xmlns="">
           <p:sp>
             <p:nvSpPr>
               <p:cNvPr id="30" name="TextBox 29">
@@ -4100,8 +4108,8 @@
           </p:sp>
         </mc:Fallback>
       </mc:AlternateContent>
-      <mc:AlternateContent xmlns:mc="http://schemas.openxmlformats.org/markup-compatibility/2006">
-        <mc:Choice xmlns:a14="http://schemas.microsoft.com/office/drawing/2010/main" Requires="a14">
+      <mc:AlternateContent xmlns:mc="http://schemas.openxmlformats.org/markup-compatibility/2006" xmlns:a14="http://schemas.microsoft.com/office/drawing/2010/main">
+        <mc:Choice Requires="a14">
           <p:sp>
             <p:nvSpPr>
               <p:cNvPr id="31" name="TextBox 30">
@@ -4528,7 +4536,7 @@
             </p:txBody>
           </p:sp>
         </mc:Choice>
-        <mc:Fallback>
+        <mc:Fallback xmlns="">
           <p:sp>
             <p:nvSpPr>
               <p:cNvPr id="31" name="TextBox 30">
@@ -4863,146 +4871,461 @@
           </a:fontRef>
         </p:style>
       </p:cxnSp>
-      <p:sp>
-        <p:nvSpPr>
-          <p:cNvPr id="61" name="TextBox 60">
-            <a:extLst>
-              <a:ext uri="{FF2B5EF4-FFF2-40B4-BE49-F238E27FC236}">
-                <a16:creationId xmlns:a16="http://schemas.microsoft.com/office/drawing/2014/main" id="{B5B4B4E4-0052-4D95-ADBB-EB01C02D0DE6}"/>
-              </a:ext>
-            </a:extLst>
-          </p:cNvPr>
-          <p:cNvSpPr txBox="1"/>
-          <p:nvPr/>
-        </p:nvSpPr>
-        <p:spPr>
-          <a:xfrm>
-            <a:off x="1950720" y="8483664"/>
-            <a:ext cx="780240" cy="276999"/>
-          </a:xfrm>
-          <a:prstGeom prst="rect">
-            <a:avLst/>
-          </a:prstGeom>
-          <a:noFill/>
-        </p:spPr>
-        <p:txBody>
-          <a:bodyPr wrap="square" rtlCol="0">
-            <a:spAutoFit/>
-          </a:bodyPr>
-          <a:lstStyle/>
-          <a:p>
-            <a:pPr algn="ctr"/>
-            <a:r>
-              <a:rPr lang="en-US" sz="1200" dirty="0" err="1"/>
-              <a:t>Pik</a:t>
-            </a:r>
-            <a:r>
-              <a:rPr lang="en-US" sz="1200" dirty="0"/>
-              <a:t> 1</a:t>
-            </a:r>
-          </a:p>
-        </p:txBody>
-      </p:sp>
-      <p:sp>
-        <p:nvSpPr>
-          <p:cNvPr id="62" name="TextBox 61">
-            <a:extLst>
-              <a:ext uri="{FF2B5EF4-FFF2-40B4-BE49-F238E27FC236}">
-                <a16:creationId xmlns:a16="http://schemas.microsoft.com/office/drawing/2014/main" id="{95694444-5CCA-4D13-9D4D-935D58CFAC2D}"/>
-              </a:ext>
-            </a:extLst>
-          </p:cNvPr>
-          <p:cNvSpPr txBox="1"/>
-          <p:nvPr/>
-        </p:nvSpPr>
-        <p:spPr>
-          <a:xfrm>
-            <a:off x="1945696" y="10604498"/>
-            <a:ext cx="780240" cy="276999"/>
-          </a:xfrm>
-          <a:prstGeom prst="rect">
-            <a:avLst/>
-          </a:prstGeom>
-          <a:noFill/>
-        </p:spPr>
-        <p:txBody>
-          <a:bodyPr wrap="square" rtlCol="0">
-            <a:spAutoFit/>
-          </a:bodyPr>
-          <a:lstStyle/>
-          <a:p>
-            <a:pPr algn="ctr"/>
-            <a:r>
-              <a:rPr lang="en-US" sz="1200" dirty="0" err="1"/>
-              <a:t>Pik</a:t>
-            </a:r>
-            <a:r>
-              <a:rPr lang="en-US" sz="1200" dirty="0"/>
-              <a:t> 7</a:t>
-            </a:r>
-          </a:p>
-        </p:txBody>
-      </p:sp>
-      <p:sp>
-        <p:nvSpPr>
-          <p:cNvPr id="63" name="TextBox 62">
-            <a:extLst>
-              <a:ext uri="{FF2B5EF4-FFF2-40B4-BE49-F238E27FC236}">
-                <a16:creationId xmlns:a16="http://schemas.microsoft.com/office/drawing/2014/main" id="{75FBC67C-AB4D-4D2F-B599-1B5D12663A5E}"/>
-              </a:ext>
-            </a:extLst>
-          </p:cNvPr>
-          <p:cNvSpPr txBox="1"/>
-          <p:nvPr/>
-        </p:nvSpPr>
-        <p:spPr>
-          <a:xfrm>
-            <a:off x="5052344" y="10828553"/>
-            <a:ext cx="4398909" cy="246221"/>
-          </a:xfrm>
-          <a:prstGeom prst="rect">
-            <a:avLst/>
-          </a:prstGeom>
-          <a:noFill/>
-        </p:spPr>
-        <p:txBody>
-          <a:bodyPr wrap="square" rtlCol="0">
-            <a:spAutoFit/>
-          </a:bodyPr>
-          <a:lstStyle/>
-          <a:p>
-            <a:r>
-              <a:rPr lang="pl-PL" sz="1000" dirty="0"/>
-              <a:t>Dla pików 1,7 została dopasowana </a:t>
-            </a:r>
-            <a:r>
-              <a:rPr lang="en-US" sz="1000" dirty="0" err="1"/>
-              <a:t>pojedyncza</a:t>
-            </a:r>
-            <a:r>
-              <a:rPr lang="en-US" sz="1000" dirty="0"/>
-              <a:t> </a:t>
-            </a:r>
-            <a:r>
-              <a:rPr lang="en-US" sz="1000" dirty="0" err="1"/>
-              <a:t>funkcja</a:t>
-            </a:r>
-            <a:r>
-              <a:rPr lang="en-US" sz="1000" dirty="0"/>
-              <a:t> </a:t>
-            </a:r>
-            <a:r>
-              <a:rPr lang="en-US" sz="1000" dirty="0" err="1"/>
-              <a:t>Voigt’a</a:t>
-            </a:r>
-            <a:r>
-              <a:rPr lang="pl-PL" sz="1000" dirty="0"/>
-              <a:t> dla konfiguracji VV.</a:t>
-            </a:r>
-            <a:endParaRPr lang="en-US" sz="1000" dirty="0"/>
-          </a:p>
-        </p:txBody>
-      </p:sp>
+      <mc:AlternateContent xmlns:mc="http://schemas.openxmlformats.org/markup-compatibility/2006" xmlns:a14="http://schemas.microsoft.com/office/drawing/2010/main">
+        <mc:Choice Requires="a14">
+          <p:sp>
+            <p:nvSpPr>
+              <p:cNvPr id="61" name="TextBox 60">
+                <a:extLst>
+                  <a:ext uri="{FF2B5EF4-FFF2-40B4-BE49-F238E27FC236}">
+                    <a16:creationId xmlns:a16="http://schemas.microsoft.com/office/drawing/2014/main" id="{B5B4B4E4-0052-4D95-ADBB-EB01C02D0DE6}"/>
+                  </a:ext>
+                </a:extLst>
+              </p:cNvPr>
+              <p:cNvSpPr txBox="1"/>
+              <p:nvPr/>
+            </p:nvSpPr>
+            <p:spPr>
+              <a:xfrm>
+                <a:off x="1586116" y="8491055"/>
+                <a:ext cx="1553236" cy="276999"/>
+              </a:xfrm>
+              <a:prstGeom prst="rect">
+                <a:avLst/>
+              </a:prstGeom>
+              <a:noFill/>
+            </p:spPr>
+            <p:txBody>
+              <a:bodyPr wrap="square" rtlCol="0">
+                <a:spAutoFit/>
+              </a:bodyPr>
+              <a:lstStyle/>
+              <a:p>
+                <a:pPr algn="ctr"/>
+                <a:r>
+                  <a:rPr lang="en-US" sz="1200" dirty="0" err="1"/>
+                  <a:t>Pik</a:t>
+                </a:r>
+                <a:r>
+                  <a:rPr lang="en-US" sz="1200" dirty="0"/>
+                  <a:t> 1</a:t>
+                </a:r>
+                <a:r>
+                  <a:rPr lang="pl-PL" sz="1200" dirty="0"/>
+                  <a:t> (</a:t>
+                </a:r>
+                <a14:m>
+                  <m:oMath xmlns:m="http://schemas.openxmlformats.org/officeDocument/2006/math">
+                    <m:r>
+                      <a:rPr lang="pl-PL" sz="1200" i="1">
+                        <a:latin typeface="Cambria Math" panose="02040503050406030204" pitchFamily="18" charset="0"/>
+                      </a:rPr>
+                      <m:t>117 </m:t>
+                    </m:r>
+                    <m:sSup>
+                      <m:sSupPr>
+                        <m:ctrlPr>
+                          <a:rPr lang="pl-PL" sz="1200" i="1">
+                            <a:latin typeface="Cambria Math" panose="02040503050406030204" pitchFamily="18" charset="0"/>
+                          </a:rPr>
+                        </m:ctrlPr>
+                      </m:sSupPr>
+                      <m:e>
+                        <m:r>
+                          <a:rPr lang="pl-PL" sz="1200" i="1">
+                            <a:latin typeface="Cambria Math" panose="02040503050406030204" pitchFamily="18" charset="0"/>
+                          </a:rPr>
+                          <m:t>𝑐𝑚</m:t>
+                        </m:r>
+                      </m:e>
+                      <m:sup>
+                        <m:r>
+                          <a:rPr lang="pl-PL" sz="1200" i="1">
+                            <a:latin typeface="Cambria Math" panose="02040503050406030204" pitchFamily="18" charset="0"/>
+                          </a:rPr>
+                          <m:t>−1</m:t>
+                        </m:r>
+                      </m:sup>
+                    </m:sSup>
+                  </m:oMath>
+                </a14:m>
+                <a:r>
+                  <a:rPr lang="pl-PL" sz="1200" dirty="0"/>
+                  <a:t>)</a:t>
+                </a:r>
+                <a:endParaRPr lang="en-US" sz="1200" dirty="0"/>
+              </a:p>
+            </p:txBody>
+          </p:sp>
+        </mc:Choice>
+        <mc:Fallback xmlns="">
+          <p:sp>
+            <p:nvSpPr>
+              <p:cNvPr id="61" name="TextBox 60">
+                <a:extLst>
+                  <a:ext uri="{FF2B5EF4-FFF2-40B4-BE49-F238E27FC236}">
+                    <a16:creationId xmlns:a16="http://schemas.microsoft.com/office/drawing/2014/main" id="{B5B4B4E4-0052-4D95-ADBB-EB01C02D0DE6}"/>
+                  </a:ext>
+                </a:extLst>
+              </p:cNvPr>
+              <p:cNvSpPr txBox="1">
+                <a:spLocks noRot="1" noChangeAspect="1" noMove="1" noResize="1" noEditPoints="1" noAdjustHandles="1" noChangeArrowheads="1" noChangeShapeType="1" noTextEdit="1"/>
+              </p:cNvSpPr>
+              <p:nvPr/>
+            </p:nvSpPr>
+            <p:spPr>
+              <a:xfrm>
+                <a:off x="1586116" y="8491055"/>
+                <a:ext cx="1553236" cy="276999"/>
+              </a:xfrm>
+              <a:prstGeom prst="rect">
+                <a:avLst/>
+              </a:prstGeom>
+              <a:blipFill>
+                <a:blip r:embed="rId16"/>
+                <a:stretch>
+                  <a:fillRect b="-20000"/>
+                </a:stretch>
+              </a:blipFill>
+            </p:spPr>
+            <p:txBody>
+              <a:bodyPr/>
+              <a:lstStyle/>
+              <a:p>
+                <a:r>
+                  <a:rPr lang="en-US">
+                    <a:noFill/>
+                  </a:rPr>
+                  <a:t> </a:t>
+                </a:r>
+              </a:p>
+            </p:txBody>
+          </p:sp>
+        </mc:Fallback>
+      </mc:AlternateContent>
+      <mc:AlternateContent xmlns:mc="http://schemas.openxmlformats.org/markup-compatibility/2006" xmlns:a14="http://schemas.microsoft.com/office/drawing/2010/main">
+        <mc:Choice Requires="a14">
+          <p:sp>
+            <p:nvSpPr>
+              <p:cNvPr id="62" name="TextBox 61">
+                <a:extLst>
+                  <a:ext uri="{FF2B5EF4-FFF2-40B4-BE49-F238E27FC236}">
+                    <a16:creationId xmlns:a16="http://schemas.microsoft.com/office/drawing/2014/main" id="{95694444-5CCA-4D13-9D4D-935D58CFAC2D}"/>
+                  </a:ext>
+                </a:extLst>
+              </p:cNvPr>
+              <p:cNvSpPr txBox="1"/>
+              <p:nvPr/>
+            </p:nvSpPr>
+            <p:spPr>
+              <a:xfrm>
+                <a:off x="1613414" y="10635994"/>
+                <a:ext cx="1498640" cy="276999"/>
+              </a:xfrm>
+              <a:prstGeom prst="rect">
+                <a:avLst/>
+              </a:prstGeom>
+              <a:noFill/>
+            </p:spPr>
+            <p:txBody>
+              <a:bodyPr wrap="square" rtlCol="0">
+                <a:spAutoFit/>
+              </a:bodyPr>
+              <a:lstStyle/>
+              <a:p>
+                <a:pPr algn="ctr"/>
+                <a:r>
+                  <a:rPr lang="en-US" sz="1200" dirty="0" err="1"/>
+                  <a:t>Pik</a:t>
+                </a:r>
+                <a:r>
+                  <a:rPr lang="en-US" sz="1200" dirty="0"/>
+                  <a:t> 7</a:t>
+                </a:r>
+                <a:r>
+                  <a:rPr lang="pl-PL" sz="1200" dirty="0"/>
+                  <a:t> (</a:t>
+                </a:r>
+                <a14:m>
+                  <m:oMath xmlns:m="http://schemas.openxmlformats.org/officeDocument/2006/math">
+                    <m:sSup>
+                      <m:sSupPr>
+                        <m:ctrlPr>
+                          <a:rPr lang="pl-PL" sz="1200" i="1" dirty="0">
+                            <a:latin typeface="Cambria Math" panose="02040503050406030204" pitchFamily="18" charset="0"/>
+                          </a:rPr>
+                        </m:ctrlPr>
+                      </m:sSupPr>
+                      <m:e>
+                        <m:r>
+                          <a:rPr lang="pl-PL" sz="1200" i="1" dirty="0">
+                            <a:latin typeface="Cambria Math" panose="02040503050406030204" pitchFamily="18" charset="0"/>
+                          </a:rPr>
+                          <m:t>390 </m:t>
+                        </m:r>
+                        <m:r>
+                          <a:rPr lang="pl-PL" sz="1200" i="1" dirty="0">
+                            <a:latin typeface="Cambria Math" panose="02040503050406030204" pitchFamily="18" charset="0"/>
+                          </a:rPr>
+                          <m:t>𝑐𝑚</m:t>
+                        </m:r>
+                      </m:e>
+                      <m:sup>
+                        <m:r>
+                          <a:rPr lang="pl-PL" sz="1200" i="1" dirty="0">
+                            <a:latin typeface="Cambria Math" panose="02040503050406030204" pitchFamily="18" charset="0"/>
+                          </a:rPr>
+                          <m:t>−1</m:t>
+                        </m:r>
+                      </m:sup>
+                    </m:sSup>
+                  </m:oMath>
+                </a14:m>
+                <a:r>
+                  <a:rPr lang="pl-PL" sz="1200" dirty="0"/>
+                  <a:t>)</a:t>
+                </a:r>
+                <a:endParaRPr lang="en-US" sz="1200" dirty="0"/>
+              </a:p>
+            </p:txBody>
+          </p:sp>
+        </mc:Choice>
+        <mc:Fallback xmlns="">
+          <p:sp>
+            <p:nvSpPr>
+              <p:cNvPr id="62" name="TextBox 61">
+                <a:extLst>
+                  <a:ext uri="{FF2B5EF4-FFF2-40B4-BE49-F238E27FC236}">
+                    <a16:creationId xmlns:a16="http://schemas.microsoft.com/office/drawing/2014/main" id="{95694444-5CCA-4D13-9D4D-935D58CFAC2D}"/>
+                  </a:ext>
+                </a:extLst>
+              </p:cNvPr>
+              <p:cNvSpPr txBox="1">
+                <a:spLocks noRot="1" noChangeAspect="1" noMove="1" noResize="1" noEditPoints="1" noAdjustHandles="1" noChangeArrowheads="1" noChangeShapeType="1" noTextEdit="1"/>
+              </p:cNvSpPr>
+              <p:nvPr/>
+            </p:nvSpPr>
+            <p:spPr>
+              <a:xfrm>
+                <a:off x="1613414" y="10635994"/>
+                <a:ext cx="1498640" cy="276999"/>
+              </a:xfrm>
+              <a:prstGeom prst="rect">
+                <a:avLst/>
+              </a:prstGeom>
+              <a:blipFill>
+                <a:blip r:embed="rId17"/>
+                <a:stretch>
+                  <a:fillRect b="-20000"/>
+                </a:stretch>
+              </a:blipFill>
+            </p:spPr>
+            <p:txBody>
+              <a:bodyPr/>
+              <a:lstStyle/>
+              <a:p>
+                <a:r>
+                  <a:rPr lang="en-US">
+                    <a:noFill/>
+                  </a:rPr>
+                  <a:t> </a:t>
+                </a:r>
+              </a:p>
+            </p:txBody>
+          </p:sp>
+        </mc:Fallback>
+      </mc:AlternateContent>
+      <mc:AlternateContent xmlns:mc="http://schemas.openxmlformats.org/markup-compatibility/2006" xmlns:a14="http://schemas.microsoft.com/office/drawing/2010/main">
+        <mc:Choice Requires="a14">
+          <p:sp>
+            <p:nvSpPr>
+              <p:cNvPr id="63" name="TextBox 62">
+                <a:extLst>
+                  <a:ext uri="{FF2B5EF4-FFF2-40B4-BE49-F238E27FC236}">
+                    <a16:creationId xmlns:a16="http://schemas.microsoft.com/office/drawing/2014/main" id="{75FBC67C-AB4D-4D2F-B599-1B5D12663A5E}"/>
+                  </a:ext>
+                </a:extLst>
+              </p:cNvPr>
+              <p:cNvSpPr txBox="1"/>
+              <p:nvPr/>
+            </p:nvSpPr>
+            <p:spPr>
+              <a:xfrm>
+                <a:off x="4943868" y="10828553"/>
+                <a:ext cx="4507386" cy="861774"/>
+              </a:xfrm>
+              <a:prstGeom prst="rect">
+                <a:avLst/>
+              </a:prstGeom>
+              <a:noFill/>
+            </p:spPr>
+            <p:txBody>
+              <a:bodyPr wrap="square" rtlCol="0">
+                <a:spAutoFit/>
+              </a:bodyPr>
+              <a:lstStyle/>
+              <a:p>
+                <a:r>
+                  <a:rPr lang="pl-PL" sz="1000" dirty="0"/>
+                  <a:t>Dla pików 1,7 została dopasowana </a:t>
+                </a:r>
+                <a:r>
+                  <a:rPr lang="en-US" sz="1000" dirty="0" err="1"/>
+                  <a:t>pojedyncza</a:t>
+                </a:r>
+                <a:r>
+                  <a:rPr lang="en-US" sz="1000" dirty="0"/>
+                  <a:t> </a:t>
+                </a:r>
+                <a:r>
+                  <a:rPr lang="en-US" sz="1000" dirty="0" err="1"/>
+                  <a:t>funkcja</a:t>
+                </a:r>
+                <a:r>
+                  <a:rPr lang="en-US" sz="1000" dirty="0"/>
+                  <a:t> </a:t>
+                </a:r>
+                <a:r>
+                  <a:rPr lang="en-US" sz="1000" dirty="0" err="1"/>
+                  <a:t>Voigt’a</a:t>
+                </a:r>
+                <a:r>
+                  <a:rPr lang="pl-PL" sz="1000" dirty="0"/>
+                  <a:t> dla konfiguracji VV.</a:t>
+                </a:r>
+              </a:p>
+              <a:p>
+                <a:endParaRPr lang="pl-PL" sz="1000" dirty="0"/>
+              </a:p>
+              <a:p>
+                <a:r>
+                  <a:rPr lang="pl-PL" sz="1000" dirty="0"/>
+                  <a:t>Dobra jakość dopasowania modelu teoretycznego do widm polaryzacyjnych uzyskana dla struktury jednoskośnej pozwala twierdzić, że wyhodowane warstwy </a:t>
+                </a:r>
+                <a14:m>
+                  <m:oMath xmlns:m="http://schemas.openxmlformats.org/officeDocument/2006/math">
+                    <m:sSub>
+                      <m:sSubPr>
+                        <m:ctrlPr>
+                          <a:rPr lang="pl-PL" sz="1000" b="1" i="1">
+                            <a:latin typeface="Cambria Math" panose="02040503050406030204" pitchFamily="18" charset="0"/>
+                          </a:rPr>
+                        </m:ctrlPr>
+                      </m:sSubPr>
+                      <m:e>
+                        <m:r>
+                          <a:rPr lang="pl-PL" sz="1000" b="1">
+                            <a:latin typeface="Cambria Math" panose="02040503050406030204" pitchFamily="18" charset="0"/>
+                          </a:rPr>
+                          <m:t>𝐆𝐚</m:t>
+                        </m:r>
+                      </m:e>
+                      <m:sub>
+                        <m:r>
+                          <a:rPr lang="pl-PL" sz="1000" b="1">
+                            <a:latin typeface="Cambria Math" panose="02040503050406030204" pitchFamily="18" charset="0"/>
+                          </a:rPr>
+                          <m:t>𝟐</m:t>
+                        </m:r>
+                      </m:sub>
+                    </m:sSub>
+                    <m:sSub>
+                      <m:sSubPr>
+                        <m:ctrlPr>
+                          <a:rPr lang="pl-PL" sz="1000" b="1" i="1">
+                            <a:latin typeface="Cambria Math" panose="02040503050406030204" pitchFamily="18" charset="0"/>
+                          </a:rPr>
+                        </m:ctrlPr>
+                      </m:sSubPr>
+                      <m:e>
+                        <m:r>
+                          <a:rPr lang="pl-PL" sz="1000" b="1">
+                            <a:latin typeface="Cambria Math" panose="02040503050406030204" pitchFamily="18" charset="0"/>
+                          </a:rPr>
+                          <m:t>𝐒</m:t>
+                        </m:r>
+                      </m:e>
+                      <m:sub>
+                        <m:r>
+                          <a:rPr lang="pl-PL" sz="1000" b="1">
+                            <a:latin typeface="Cambria Math" panose="02040503050406030204" pitchFamily="18" charset="0"/>
+                          </a:rPr>
+                          <m:t>𝟑</m:t>
+                        </m:r>
+                      </m:sub>
+                    </m:sSub>
+                  </m:oMath>
+                </a14:m>
+                <a:r>
+                  <a:rPr lang="pl-PL" sz="1000" dirty="0"/>
+                  <a:t> posiadały fazę </a:t>
+                </a:r>
+                <a:r>
+                  <a:rPr lang="pl-PL" sz="1000" dirty="0" err="1"/>
+                  <a:t>monoclinic</a:t>
+                </a:r>
+                <a:r>
+                  <a:rPr lang="pl-PL" sz="1000" dirty="0"/>
+                  <a:t>, grupa przestrzenna </a:t>
+                </a:r>
+                <a:r>
+                  <a:rPr lang="pl-PL" sz="1000" dirty="0" err="1"/>
+                  <a:t>Cc</a:t>
+                </a:r>
+                <a:r>
+                  <a:rPr lang="pl-PL" sz="1000" dirty="0"/>
+                  <a:t>.</a:t>
+                </a:r>
+                <a:endParaRPr lang="en-US" sz="1000" dirty="0"/>
+              </a:p>
+            </p:txBody>
+          </p:sp>
+        </mc:Choice>
+        <mc:Fallback xmlns="">
+          <p:sp>
+            <p:nvSpPr>
+              <p:cNvPr id="63" name="TextBox 62">
+                <a:extLst>
+                  <a:ext uri="{FF2B5EF4-FFF2-40B4-BE49-F238E27FC236}">
+                    <a16:creationId xmlns:a16="http://schemas.microsoft.com/office/drawing/2014/main" id="{75FBC67C-AB4D-4D2F-B599-1B5D12663A5E}"/>
+                  </a:ext>
+                </a:extLst>
+              </p:cNvPr>
+              <p:cNvSpPr txBox="1">
+                <a:spLocks noRot="1" noChangeAspect="1" noMove="1" noResize="1" noEditPoints="1" noAdjustHandles="1" noChangeArrowheads="1" noChangeShapeType="1" noTextEdit="1"/>
+              </p:cNvSpPr>
+              <p:nvPr/>
+            </p:nvSpPr>
+            <p:spPr>
+              <a:xfrm>
+                <a:off x="4943868" y="10828553"/>
+                <a:ext cx="4507386" cy="861774"/>
+              </a:xfrm>
+              <a:prstGeom prst="rect">
+                <a:avLst/>
+              </a:prstGeom>
+              <a:blipFill>
+                <a:blip r:embed="rId18"/>
+                <a:stretch>
+                  <a:fillRect b="-3521"/>
+                </a:stretch>
+              </a:blipFill>
+            </p:spPr>
+            <p:txBody>
+              <a:bodyPr/>
+              <a:lstStyle/>
+              <a:p>
+                <a:r>
+                  <a:rPr lang="en-US">
+                    <a:noFill/>
+                  </a:rPr>
+                  <a:t> </a:t>
+                </a:r>
+              </a:p>
+            </p:txBody>
+          </p:sp>
+        </mc:Fallback>
+      </mc:AlternateContent>
       <p:sp>
         <p:nvSpPr>
           <p:cNvPr id="64" name="TextBox 63">
@@ -5055,8 +5378,8 @@
           </a:p>
         </p:txBody>
       </p:sp>
-      <mc:AlternateContent xmlns:mc="http://schemas.openxmlformats.org/markup-compatibility/2006">
-        <mc:Choice xmlns:a14="http://schemas.microsoft.com/office/drawing/2010/main" Requires="a14">
+      <mc:AlternateContent xmlns:mc="http://schemas.openxmlformats.org/markup-compatibility/2006" xmlns:a14="http://schemas.microsoft.com/office/drawing/2010/main">
+        <mc:Choice Requires="a14">
           <p:sp>
             <p:nvSpPr>
               <p:cNvPr id="65" name="TextBox 64">
@@ -5185,7 +5508,7 @@
             </p:txBody>
           </p:sp>
         </mc:Choice>
-        <mc:Fallback>
+        <mc:Fallback xmlns="">
           <p:sp>
             <p:nvSpPr>
               <p:cNvPr id="65" name="TextBox 64">
@@ -5209,7 +5532,7 @@
                 <a:avLst/>
               </a:prstGeom>
               <a:blipFill>
-                <a:blip r:embed="rId16"/>
+                <a:blip r:embed="rId19"/>
                 <a:stretch>
                   <a:fillRect t="-1429"/>
                 </a:stretch>
@@ -5230,8 +5553,8 @@
           </p:sp>
         </mc:Fallback>
       </mc:AlternateContent>
-      <mc:AlternateContent xmlns:mc="http://schemas.openxmlformats.org/markup-compatibility/2006">
-        <mc:Choice xmlns:a14="http://schemas.microsoft.com/office/drawing/2010/main" Requires="a14">
+      <mc:AlternateContent xmlns:mc="http://schemas.openxmlformats.org/markup-compatibility/2006" xmlns:a14="http://schemas.microsoft.com/office/drawing/2010/main">
+        <mc:Choice Requires="a14">
           <p:sp>
             <p:nvSpPr>
               <p:cNvPr id="66" name="TextBox 65">
@@ -5360,7 +5683,7 @@
             </p:txBody>
           </p:sp>
         </mc:Choice>
-        <mc:Fallback>
+        <mc:Fallback xmlns="">
           <p:sp>
             <p:nvSpPr>
               <p:cNvPr id="66" name="TextBox 65">
@@ -5384,7 +5707,7 @@
                 <a:avLst/>
               </a:prstGeom>
               <a:blipFill>
-                <a:blip r:embed="rId17"/>
+                <a:blip r:embed="rId20"/>
                 <a:stretch>
                   <a:fillRect t="-1408"/>
                 </a:stretch>
@@ -5405,12 +5728,225 @@
           </p:sp>
         </mc:Fallback>
       </mc:AlternateContent>
-      <p:sp>
-        <p:nvSpPr>
-          <p:cNvPr id="67" name="TextBox 66">
+      <mc:AlternateContent xmlns:mc="http://schemas.openxmlformats.org/markup-compatibility/2006" xmlns:a14="http://schemas.microsoft.com/office/drawing/2010/main">
+        <mc:Choice Requires="a14">
+          <p:sp>
+            <p:nvSpPr>
+              <p:cNvPr id="3" name="TextBox 2">
+                <a:extLst>
+                  <a:ext uri="{FF2B5EF4-FFF2-40B4-BE49-F238E27FC236}">
+                    <a16:creationId xmlns:a16="http://schemas.microsoft.com/office/drawing/2014/main" id="{58E64985-9110-4C36-8F12-ADF7A85E595D}"/>
+                  </a:ext>
+                </a:extLst>
+              </p:cNvPr>
+              <p:cNvSpPr txBox="1"/>
+              <p:nvPr/>
+            </p:nvSpPr>
+            <p:spPr>
+              <a:xfrm>
+                <a:off x="6531529" y="11972544"/>
+                <a:ext cx="2919714" cy="707886"/>
+              </a:xfrm>
+              <a:prstGeom prst="rect">
+                <a:avLst/>
+              </a:prstGeom>
+              <a:noFill/>
+            </p:spPr>
+            <p:txBody>
+              <a:bodyPr wrap="square" rtlCol="0">
+                <a:spAutoFit/>
+              </a:bodyPr>
+              <a:lstStyle/>
+              <a:p>
+                <a:r>
+                  <a:rPr lang="en-US" sz="800" dirty="0" err="1"/>
+                  <a:t>Cezariusz</a:t>
+                </a:r>
+                <a:r>
+                  <a:rPr lang="en-US" sz="800" dirty="0"/>
+                  <a:t> </a:t>
+                </a:r>
+                <a:r>
+                  <a:rPr lang="en-US" sz="800" dirty="0" err="1"/>
+                  <a:t>Jastrzębski</a:t>
+                </a:r>
+                <a:r>
+                  <a:rPr lang="en-US" sz="800" dirty="0"/>
+                  <a:t>, Daniel J. </a:t>
+                </a:r>
+                <a:r>
+                  <a:rPr lang="en-US" sz="800" dirty="0" err="1"/>
+                  <a:t>Jastrzebski</a:t>
+                </a:r>
+                <a:r>
+                  <a:rPr lang="en-US" sz="800" dirty="0"/>
+                  <a:t>, Vitali Kozak, Karolina </a:t>
+                </a:r>
+                <a:r>
+                  <a:rPr lang="en-US" sz="800" dirty="0" err="1"/>
+                  <a:t>Pietak</a:t>
+                </a:r>
+                <a:r>
+                  <a:rPr lang="en-US" sz="800" dirty="0"/>
+                  <a:t>, Wojciech </a:t>
+                </a:r>
+                <a:r>
+                  <a:rPr lang="en-US" sz="800" dirty="0" err="1"/>
+                  <a:t>Gebicki</a:t>
+                </a:r>
+                <a:r>
+                  <a:rPr lang="en-US" sz="800" dirty="0"/>
+                  <a:t> </a:t>
+                </a:r>
+                <a:r>
+                  <a:rPr lang="pl-PL" sz="800" dirty="0"/>
+                  <a:t>„</a:t>
+                </a:r>
+                <a:r>
+                  <a:rPr lang="en-US" sz="800" dirty="0"/>
+                  <a:t>Synthesis and structural characterization of thin </a:t>
+                </a:r>
+                <a14:m>
+                  <m:oMath xmlns:m="http://schemas.openxmlformats.org/officeDocument/2006/math">
+                    <m:sSub>
+                      <m:sSubPr>
+                        <m:ctrlPr>
+                          <a:rPr lang="pl-PL" sz="800" b="1" i="1">
+                            <a:latin typeface="Cambria Math" panose="02040503050406030204" pitchFamily="18" charset="0"/>
+                          </a:rPr>
+                        </m:ctrlPr>
+                      </m:sSubPr>
+                      <m:e>
+                        <m:r>
+                          <a:rPr lang="pl-PL" sz="800" b="1">
+                            <a:latin typeface="Cambria Math" panose="02040503050406030204" pitchFamily="18" charset="0"/>
+                          </a:rPr>
+                          <m:t>𝐆𝐚</m:t>
+                        </m:r>
+                      </m:e>
+                      <m:sub>
+                        <m:r>
+                          <a:rPr lang="pl-PL" sz="800" b="1">
+                            <a:latin typeface="Cambria Math" panose="02040503050406030204" pitchFamily="18" charset="0"/>
+                          </a:rPr>
+                          <m:t>𝟐</m:t>
+                        </m:r>
+                      </m:sub>
+                    </m:sSub>
+                    <m:sSub>
+                      <m:sSubPr>
+                        <m:ctrlPr>
+                          <a:rPr lang="pl-PL" sz="800" b="1" i="1">
+                            <a:latin typeface="Cambria Math" panose="02040503050406030204" pitchFamily="18" charset="0"/>
+                          </a:rPr>
+                        </m:ctrlPr>
+                      </m:sSubPr>
+                      <m:e>
+                        <m:r>
+                          <a:rPr lang="pl-PL" sz="800" b="1">
+                            <a:latin typeface="Cambria Math" panose="02040503050406030204" pitchFamily="18" charset="0"/>
+                          </a:rPr>
+                          <m:t>𝐒</m:t>
+                        </m:r>
+                      </m:e>
+                      <m:sub>
+                        <m:r>
+                          <a:rPr lang="pl-PL" sz="800" b="1">
+                            <a:latin typeface="Cambria Math" panose="02040503050406030204" pitchFamily="18" charset="0"/>
+                          </a:rPr>
+                          <m:t>𝟑</m:t>
+                        </m:r>
+                      </m:sub>
+                    </m:sSub>
+                  </m:oMath>
+                </a14:m>
+                <a:r>
+                  <a:rPr lang="en-US" sz="800" dirty="0"/>
+                  <a:t> layers on semiconducting </a:t>
+                </a:r>
+                <a:r>
+                  <a:rPr lang="pl-PL" sz="800" b="1" dirty="0" err="1"/>
+                  <a:t>GaP</a:t>
+                </a:r>
+                <a:r>
+                  <a:rPr lang="pl-PL" sz="800" b="1" dirty="0"/>
+                  <a:t> </a:t>
+                </a:r>
+                <a:r>
+                  <a:rPr lang="en-US" sz="800" dirty="0"/>
+                  <a:t>substrate</a:t>
+                </a:r>
+                <a:r>
+                  <a:rPr lang="pl-PL" sz="800" dirty="0"/>
+                  <a:t>”</a:t>
+                </a:r>
+                <a:r>
+                  <a:rPr lang="en-US" sz="800" dirty="0"/>
+                  <a:t>, </a:t>
+                </a:r>
+                <a:r>
+                  <a:rPr lang="en-US" sz="800" dirty="0" err="1"/>
+                  <a:t>złożone</a:t>
+                </a:r>
+                <a:r>
+                  <a:rPr lang="en-US" sz="800" dirty="0"/>
+                  <a:t> do Journal: Materials Science in Semiconductor Processing, 2018.</a:t>
+                </a:r>
+              </a:p>
+            </p:txBody>
+          </p:sp>
+        </mc:Choice>
+        <mc:Fallback xmlns="">
+          <p:sp>
+            <p:nvSpPr>
+              <p:cNvPr id="3" name="TextBox 2">
+                <a:extLst>
+                  <a:ext uri="{FF2B5EF4-FFF2-40B4-BE49-F238E27FC236}">
+                    <a16:creationId xmlns:a16="http://schemas.microsoft.com/office/drawing/2014/main" id="{58E64985-9110-4C36-8F12-ADF7A85E595D}"/>
+                  </a:ext>
+                </a:extLst>
+              </p:cNvPr>
+              <p:cNvSpPr txBox="1">
+                <a:spLocks noRot="1" noChangeAspect="1" noMove="1" noResize="1" noEditPoints="1" noAdjustHandles="1" noChangeArrowheads="1" noChangeShapeType="1" noTextEdit="1"/>
+              </p:cNvSpPr>
+              <p:nvPr/>
+            </p:nvSpPr>
+            <p:spPr>
+              <a:xfrm>
+                <a:off x="6531529" y="11972544"/>
+                <a:ext cx="2919714" cy="707886"/>
+              </a:xfrm>
+              <a:prstGeom prst="rect">
+                <a:avLst/>
+              </a:prstGeom>
+              <a:blipFill>
+                <a:blip r:embed="rId21"/>
+                <a:stretch>
+                  <a:fillRect b="-2586"/>
+                </a:stretch>
+              </a:blipFill>
+            </p:spPr>
+            <p:txBody>
+              <a:bodyPr/>
+              <a:lstStyle/>
+              <a:p>
+                <a:r>
+                  <a:rPr lang="en-US">
+                    <a:noFill/>
+                  </a:rPr>
+                  <a:t> </a:t>
+                </a:r>
+              </a:p>
+            </p:txBody>
+          </p:sp>
+        </mc:Fallback>
+      </mc:AlternateContent>
+      <p:sp>
+        <p:nvSpPr>
+          <p:cNvPr id="4" name="TextBox 3">
             <a:extLst>
               <a:ext uri="{FF2B5EF4-FFF2-40B4-BE49-F238E27FC236}">
-                <a16:creationId xmlns:a16="http://schemas.microsoft.com/office/drawing/2014/main" id="{44632D8E-0ED0-4265-A574-285BB75C230B}"/>
+                <a16:creationId xmlns:a16="http://schemas.microsoft.com/office/drawing/2014/main" id="{74EB7FC2-E0CE-4EB8-B577-6A72969F26C4}"/>
               </a:ext>
             </a:extLst>
           </p:cNvPr>
@@ -5419,8 +5955,8 @@
         </p:nvSpPr>
         <p:spPr>
           <a:xfrm>
-            <a:off x="5030628" y="11182103"/>
-            <a:ext cx="4338869" cy="400110"/>
+            <a:off x="2346510" y="1180446"/>
+            <a:ext cx="4908178" cy="523220"/>
           </a:xfrm>
           <a:prstGeom prst="rect">
             <a:avLst/>
@@ -5433,19 +5969,64 @@
           </a:bodyPr>
           <a:lstStyle/>
           <a:p>
-            <a:r>
-              <a:rPr lang="pl-PL" sz="1000" dirty="0"/>
-              <a:t>Dla konfiguracji VH nie udało się dopasować funkcji </a:t>
-            </a:r>
-            <a:r>
-              <a:rPr lang="en-US" sz="1000" dirty="0" err="1"/>
-              <a:t>Voigt’a</a:t>
-            </a:r>
-            <a:r>
-              <a:rPr lang="pl-PL" sz="1000" dirty="0"/>
-              <a:t>. Dopasowanie tej funkcji jest kwestią następnych badań.</a:t>
-            </a:r>
-            <a:endParaRPr lang="en-US" sz="1000" dirty="0"/>
+            <a:pPr algn="ctr"/>
+            <a:r>
+              <a:rPr lang="pl-PL" sz="1400" dirty="0"/>
+              <a:t>autor</a:t>
+            </a:r>
+            <a:r>
+              <a:rPr lang="en-US" sz="1400" i="1" dirty="0"/>
+              <a:t>: Vitali Kozak</a:t>
+            </a:r>
+            <a:endParaRPr lang="pl-PL" sz="1400" i="1" dirty="0"/>
+          </a:p>
+          <a:p>
+            <a:pPr algn="ctr"/>
+            <a:r>
+              <a:rPr lang="en-US" sz="1400" dirty="0"/>
+              <a:t>promotor</a:t>
+            </a:r>
+            <a:r>
+              <a:rPr lang="en-US" sz="1400" i="1" dirty="0"/>
+              <a:t>: </a:t>
+            </a:r>
+            <a:r>
+              <a:rPr lang="en-US" sz="1400" i="1" dirty="0" err="1"/>
+              <a:t>dr</a:t>
+            </a:r>
+            <a:r>
+              <a:rPr lang="en-US" sz="1400" i="1" dirty="0"/>
+              <a:t> in</a:t>
+            </a:r>
+            <a:r>
+              <a:rPr lang="pl-PL" sz="1400" i="1" dirty="0"/>
+              <a:t>ż. </a:t>
+            </a:r>
+            <a:r>
+              <a:rPr lang="en-US" sz="1400" i="1" dirty="0"/>
+              <a:t>Cezar</a:t>
+            </a:r>
+            <a:r>
+              <a:rPr lang="pl-PL" sz="1400" i="1" dirty="0"/>
+              <a:t>i</a:t>
+            </a:r>
+            <a:r>
+              <a:rPr lang="en-US" sz="1400" i="1" dirty="0" err="1"/>
+              <a:t>usz</a:t>
+            </a:r>
+            <a:r>
+              <a:rPr lang="en-US" sz="1400" i="1" dirty="0"/>
+              <a:t> </a:t>
+            </a:r>
+            <a:r>
+              <a:rPr lang="en-US" sz="1400" i="1" dirty="0" err="1"/>
+              <a:t>Jastrz</a:t>
+            </a:r>
+            <a:r>
+              <a:rPr lang="pl-PL" sz="1400" i="1" dirty="0" err="1"/>
+              <a:t>ębski</a:t>
+            </a:r>
+            <a:endParaRPr lang="en-US" sz="1400" i="1" dirty="0"/>
           </a:p>
         </p:txBody>
       </p:sp>

</xml_diff>